<commit_message>
TESTE, commit com uma modificação de teste
</commit_message>
<xml_diff>
--- a/Curso de Introdução à linguagem Scala.pptx
+++ b/Curso de Introdução à linguagem Scala.pptx
@@ -109,6 +109,11 @@
       </a:defRPr>
     </a:lvl9pPr>
   </p:defaultTextStyle>
+  <p:extLst>
+    <p:ext uri="{EFAFB233-063F-42B5-8137-9DF3F51BA10A}">
+      <p15:sldGuideLst xmlns:p15="http://schemas.microsoft.com/office/powerpoint/2012/main"/>
+    </p:ext>
+  </p:extLst>
 </p:presentation>
 </file>
 
@@ -367,7 +372,7 @@
           <a:p>
             <a:fld id="{CA64F9DD-C15D-4E0C-822A-CD446CF999AE}" type="slidenum">
               <a:rPr lang="pt-BR" smtClean="0"/>
-              <a:t>‹#›</a:t>
+              <a:t>‹nº›</a:t>
             </a:fld>
             <a:endParaRPr lang="pt-BR"/>
           </a:p>
@@ -663,7 +668,7 @@
           <a:p>
             <a:fld id="{CA64F9DD-C15D-4E0C-822A-CD446CF999AE}" type="slidenum">
               <a:rPr lang="pt-BR" smtClean="0"/>
-              <a:t>‹#›</a:t>
+              <a:t>‹nº›</a:t>
             </a:fld>
             <a:endParaRPr lang="pt-BR"/>
           </a:p>
@@ -922,7 +927,7 @@
           <a:p>
             <a:fld id="{CA64F9DD-C15D-4E0C-822A-CD446CF999AE}" type="slidenum">
               <a:rPr lang="pt-BR" smtClean="0"/>
-              <a:t>‹#›</a:t>
+              <a:t>‹nº›</a:t>
             </a:fld>
             <a:endParaRPr lang="pt-BR"/>
           </a:p>
@@ -1391,7 +1396,7 @@
           <a:p>
             <a:fld id="{CA64F9DD-C15D-4E0C-822A-CD446CF999AE}" type="slidenum">
               <a:rPr lang="pt-BR" smtClean="0"/>
-              <a:t>‹#›</a:t>
+              <a:t>‹nº›</a:t>
             </a:fld>
             <a:endParaRPr lang="pt-BR"/>
           </a:p>
@@ -1571,7 +1576,7 @@
           <a:p>
             <a:fld id="{CA64F9DD-C15D-4E0C-822A-CD446CF999AE}" type="slidenum">
               <a:rPr lang="pt-BR" smtClean="0"/>
-              <a:t>‹#›</a:t>
+              <a:t>‹nº›</a:t>
             </a:fld>
             <a:endParaRPr lang="pt-BR"/>
           </a:p>
@@ -2147,7 +2152,7 @@
           <a:p>
             <a:fld id="{CA64F9DD-C15D-4E0C-822A-CD446CF999AE}" type="slidenum">
               <a:rPr lang="pt-BR" smtClean="0"/>
-              <a:t>‹#›</a:t>
+              <a:t>‹nº›</a:t>
             </a:fld>
             <a:endParaRPr lang="pt-BR"/>
           </a:p>
@@ -2479,7 +2484,7 @@
           <a:p>
             <a:fld id="{CA64F9DD-C15D-4E0C-822A-CD446CF999AE}" type="slidenum">
               <a:rPr lang="pt-BR" smtClean="0"/>
-              <a:t>‹#›</a:t>
+              <a:t>‹nº›</a:t>
             </a:fld>
             <a:endParaRPr lang="pt-BR"/>
           </a:p>
@@ -2654,7 +2659,7 @@
           <a:p>
             <a:fld id="{CA64F9DD-C15D-4E0C-822A-CD446CF999AE}" type="slidenum">
               <a:rPr lang="pt-BR" smtClean="0"/>
-              <a:t>‹#›</a:t>
+              <a:t>‹nº›</a:t>
             </a:fld>
             <a:endParaRPr lang="pt-BR"/>
           </a:p>
@@ -2834,7 +2839,7 @@
           <a:p>
             <a:fld id="{CA64F9DD-C15D-4E0C-822A-CD446CF999AE}" type="slidenum">
               <a:rPr lang="pt-BR" smtClean="0"/>
-              <a:t>‹#›</a:t>
+              <a:t>‹nº›</a:t>
             </a:fld>
             <a:endParaRPr lang="pt-BR"/>
           </a:p>
@@ -3009,7 +3014,7 @@
           <a:p>
             <a:fld id="{CA64F9DD-C15D-4E0C-822A-CD446CF999AE}" type="slidenum">
               <a:rPr lang="pt-BR" smtClean="0"/>
-              <a:t>‹#›</a:t>
+              <a:t>‹nº›</a:t>
             </a:fld>
             <a:endParaRPr lang="pt-BR"/>
           </a:p>
@@ -3266,7 +3271,7 @@
           <a:p>
             <a:fld id="{CA64F9DD-C15D-4E0C-822A-CD446CF999AE}" type="slidenum">
               <a:rPr lang="pt-BR" smtClean="0"/>
-              <a:t>‹#›</a:t>
+              <a:t>‹nº›</a:t>
             </a:fld>
             <a:endParaRPr lang="pt-BR"/>
           </a:p>
@@ -3563,7 +3568,7 @@
           <a:p>
             <a:fld id="{CA64F9DD-C15D-4E0C-822A-CD446CF999AE}" type="slidenum">
               <a:rPr lang="pt-BR" smtClean="0"/>
-              <a:t>‹#›</a:t>
+              <a:t>‹nº›</a:t>
             </a:fld>
             <a:endParaRPr lang="pt-BR"/>
           </a:p>
@@ -3993,7 +3998,7 @@
           <a:p>
             <a:fld id="{CA64F9DD-C15D-4E0C-822A-CD446CF999AE}" type="slidenum">
               <a:rPr lang="pt-BR" smtClean="0"/>
-              <a:t>‹#›</a:t>
+              <a:t>‹nº›</a:t>
             </a:fld>
             <a:endParaRPr lang="pt-BR"/>
           </a:p>
@@ -4111,7 +4116,7 @@
           <a:p>
             <a:fld id="{CA64F9DD-C15D-4E0C-822A-CD446CF999AE}" type="slidenum">
               <a:rPr lang="pt-BR" smtClean="0"/>
-              <a:t>‹#›</a:t>
+              <a:t>‹nº›</a:t>
             </a:fld>
             <a:endParaRPr lang="pt-BR"/>
           </a:p>
@@ -4206,7 +4211,7 @@
           <a:p>
             <a:fld id="{CA64F9DD-C15D-4E0C-822A-CD446CF999AE}" type="slidenum">
               <a:rPr lang="pt-BR" smtClean="0"/>
-              <a:t>‹#›</a:t>
+              <a:t>‹nº›</a:t>
             </a:fld>
             <a:endParaRPr lang="pt-BR"/>
           </a:p>
@@ -4489,7 +4494,7 @@
           <a:p>
             <a:fld id="{CA64F9DD-C15D-4E0C-822A-CD446CF999AE}" type="slidenum">
               <a:rPr lang="pt-BR" smtClean="0"/>
-              <a:t>‹#›</a:t>
+              <a:t>‹nº›</a:t>
             </a:fld>
             <a:endParaRPr lang="pt-BR"/>
           </a:p>
@@ -4790,7 +4795,7 @@
           <a:p>
             <a:fld id="{CA64F9DD-C15D-4E0C-822A-CD446CF999AE}" type="slidenum">
               <a:rPr lang="pt-BR" smtClean="0"/>
-              <a:t>‹#›</a:t>
+              <a:t>‹nº›</a:t>
             </a:fld>
             <a:endParaRPr lang="pt-BR"/>
           </a:p>
@@ -5063,7 +5068,7 @@
           <a:p>
             <a:fld id="{CA64F9DD-C15D-4E0C-822A-CD446CF999AE}" type="slidenum">
               <a:rPr lang="pt-BR" smtClean="0"/>
-              <a:t>‹#›</a:t>
+              <a:t>‹nº›</a:t>
             </a:fld>
             <a:endParaRPr lang="pt-BR"/>
           </a:p>
@@ -6165,7 +6170,11 @@
           <a:p>
             <a:r>
               <a:rPr lang="pt-BR" dirty="0" smtClean="0"/>
-              <a:t>[Coloque aqui seu nome e R.A.]</a:t>
+              <a:t>[Coloque aqui seu nome e R.A</a:t>
+            </a:r>
+            <a:r>
+              <a:rPr lang="pt-BR" smtClean="0"/>
+              <a:t>.(Ex.: NOME – 142BXX)]</a:t>
             </a:r>
             <a:endParaRPr lang="pt-BR" dirty="0"/>
           </a:p>

</xml_diff>